<commit_message>
addeded comment about videos
</commit_message>
<xml_diff>
--- a/Wk4/Thousand words.pptx
+++ b/Wk4/Thousand words.pptx
@@ -1187,6 +1187,13 @@
         </dgm:presLayoutVars>
       </dgm:prSet>
       <dgm:spPr/>
+      <dgm:t>
+        <a:bodyPr/>
+        <a:lstStyle/>
+        <a:p>
+          <a:endParaRPr lang="en-GB"/>
+        </a:p>
+      </dgm:t>
     </dgm:pt>
     <dgm:pt modelId="{CDA57C9E-63F6-46F7-9D17-ECFCBCAA2C61}" type="pres">
       <dgm:prSet presAssocID="{66454608-27B1-4DF0-A566-A514F2B91C06}" presName="dummyMaxCanvas" presStyleCnt="0">
@@ -1216,6 +1223,13 @@
         </dgm:presLayoutVars>
       </dgm:prSet>
       <dgm:spPr/>
+      <dgm:t>
+        <a:bodyPr/>
+        <a:lstStyle/>
+        <a:p>
+          <a:endParaRPr lang="en-GB"/>
+        </a:p>
+      </dgm:t>
     </dgm:pt>
     <dgm:pt modelId="{672BFA8E-3BE0-4232-A4EE-5B4C3DF182A5}" type="pres">
       <dgm:prSet presAssocID="{66454608-27B1-4DF0-A566-A514F2B91C06}" presName="ThreeNodes_3" presStyleLbl="node1" presStyleIdx="2" presStyleCnt="3">
@@ -1224,6 +1238,13 @@
         </dgm:presLayoutVars>
       </dgm:prSet>
       <dgm:spPr/>
+      <dgm:t>
+        <a:bodyPr/>
+        <a:lstStyle/>
+        <a:p>
+          <a:endParaRPr lang="en-GB"/>
+        </a:p>
+      </dgm:t>
     </dgm:pt>
     <dgm:pt modelId="{EDFE616E-9164-4E53-BE1E-CEE5850A9B92}" type="pres">
       <dgm:prSet presAssocID="{66454608-27B1-4DF0-A566-A514F2B91C06}" presName="ThreeConn_1-2" presStyleLbl="fgAccFollowNode1" presStyleIdx="0" presStyleCnt="2">
@@ -1232,6 +1253,13 @@
         </dgm:presLayoutVars>
       </dgm:prSet>
       <dgm:spPr/>
+      <dgm:t>
+        <a:bodyPr/>
+        <a:lstStyle/>
+        <a:p>
+          <a:endParaRPr lang="en-GB"/>
+        </a:p>
+      </dgm:t>
     </dgm:pt>
     <dgm:pt modelId="{2E99EF95-4823-4E3C-BC3E-3AE5F5356A91}" type="pres">
       <dgm:prSet presAssocID="{66454608-27B1-4DF0-A566-A514F2B91C06}" presName="ThreeConn_2-3" presStyleLbl="fgAccFollowNode1" presStyleIdx="1" presStyleCnt="2">
@@ -1240,6 +1268,13 @@
         </dgm:presLayoutVars>
       </dgm:prSet>
       <dgm:spPr/>
+      <dgm:t>
+        <a:bodyPr/>
+        <a:lstStyle/>
+        <a:p>
+          <a:endParaRPr lang="en-GB"/>
+        </a:p>
+      </dgm:t>
     </dgm:pt>
     <dgm:pt modelId="{DED7F35F-28F2-4B73-A2A6-F3CD00CA3DEF}" type="pres">
       <dgm:prSet presAssocID="{66454608-27B1-4DF0-A566-A514F2B91C06}" presName="ThreeNodes_1_text" presStyleLbl="node1" presStyleIdx="2" presStyleCnt="3">
@@ -1263,6 +1298,13 @@
         </dgm:presLayoutVars>
       </dgm:prSet>
       <dgm:spPr/>
+      <dgm:t>
+        <a:bodyPr/>
+        <a:lstStyle/>
+        <a:p>
+          <a:endParaRPr lang="en-GB"/>
+        </a:p>
+      </dgm:t>
     </dgm:pt>
     <dgm:pt modelId="{E10C2E77-5633-4479-8E35-BCD1E527D720}" type="pres">
       <dgm:prSet presAssocID="{66454608-27B1-4DF0-A566-A514F2B91C06}" presName="ThreeNodes_3_text" presStyleLbl="node1" presStyleIdx="2" presStyleCnt="3">
@@ -1271,6 +1313,13 @@
         </dgm:presLayoutVars>
       </dgm:prSet>
       <dgm:spPr/>
+      <dgm:t>
+        <a:bodyPr/>
+        <a:lstStyle/>
+        <a:p>
+          <a:endParaRPr lang="en-GB"/>
+        </a:p>
+      </dgm:t>
     </dgm:pt>
   </dgm:ptLst>
   <dgm:cxnLst>
@@ -3742,7 +3791,8 @@
           <a:p>
             <a:fld id="{9A8162A6-AFB1-40CE-BFCE-BD39DA0AC5AC}" type="datetimeFigureOut">
               <a:rPr lang="en-US" smtClean="0"/>
-              <a:t>12/14/2010</a:t>
+              <a:pPr/>
+              <a:t>12/16/2010</a:t>
             </a:fld>
             <a:endParaRPr lang="en-GB"/>
           </a:p>
@@ -3784,6 +3834,7 @@
           <a:p>
             <a:fld id="{BE51FA57-2C5B-4F35-8B3F-13B1820A9FFF}" type="slidenum">
               <a:rPr lang="en-GB" smtClean="0"/>
+              <a:pPr/>
               <a:t>‹#›</a:t>
             </a:fld>
             <a:endParaRPr lang="en-GB"/>
@@ -3907,7 +3958,8 @@
           <a:p>
             <a:fld id="{9A8162A6-AFB1-40CE-BFCE-BD39DA0AC5AC}" type="datetimeFigureOut">
               <a:rPr lang="en-US" smtClean="0"/>
-              <a:t>12/14/2010</a:t>
+              <a:pPr/>
+              <a:t>12/16/2010</a:t>
             </a:fld>
             <a:endParaRPr lang="en-GB"/>
           </a:p>
@@ -3949,6 +4001,7 @@
           <a:p>
             <a:fld id="{BE51FA57-2C5B-4F35-8B3F-13B1820A9FFF}" type="slidenum">
               <a:rPr lang="en-GB" smtClean="0"/>
+              <a:pPr/>
               <a:t>‹#›</a:t>
             </a:fld>
             <a:endParaRPr lang="en-GB"/>
@@ -4082,7 +4135,8 @@
           <a:p>
             <a:fld id="{9A8162A6-AFB1-40CE-BFCE-BD39DA0AC5AC}" type="datetimeFigureOut">
               <a:rPr lang="en-US" smtClean="0"/>
-              <a:t>12/14/2010</a:t>
+              <a:pPr/>
+              <a:t>12/16/2010</a:t>
             </a:fld>
             <a:endParaRPr lang="en-GB"/>
           </a:p>
@@ -4124,6 +4178,7 @@
           <a:p>
             <a:fld id="{BE51FA57-2C5B-4F35-8B3F-13B1820A9FFF}" type="slidenum">
               <a:rPr lang="en-GB" smtClean="0"/>
+              <a:pPr/>
               <a:t>‹#›</a:t>
             </a:fld>
             <a:endParaRPr lang="en-GB"/>
@@ -4247,7 +4302,8 @@
           <a:p>
             <a:fld id="{9A8162A6-AFB1-40CE-BFCE-BD39DA0AC5AC}" type="datetimeFigureOut">
               <a:rPr lang="en-US" smtClean="0"/>
-              <a:t>12/14/2010</a:t>
+              <a:pPr/>
+              <a:t>12/16/2010</a:t>
             </a:fld>
             <a:endParaRPr lang="en-GB"/>
           </a:p>
@@ -4289,6 +4345,7 @@
           <a:p>
             <a:fld id="{BE51FA57-2C5B-4F35-8B3F-13B1820A9FFF}" type="slidenum">
               <a:rPr lang="en-GB" smtClean="0"/>
+              <a:pPr/>
               <a:t>‹#›</a:t>
             </a:fld>
             <a:endParaRPr lang="en-GB"/>
@@ -4488,7 +4545,8 @@
           <a:p>
             <a:fld id="{9A8162A6-AFB1-40CE-BFCE-BD39DA0AC5AC}" type="datetimeFigureOut">
               <a:rPr lang="en-US" smtClean="0"/>
-              <a:t>12/14/2010</a:t>
+              <a:pPr/>
+              <a:t>12/16/2010</a:t>
             </a:fld>
             <a:endParaRPr lang="en-GB"/>
           </a:p>
@@ -4530,6 +4588,7 @@
           <a:p>
             <a:fld id="{BE51FA57-2C5B-4F35-8B3F-13B1820A9FFF}" type="slidenum">
               <a:rPr lang="en-GB" smtClean="0"/>
+              <a:pPr/>
               <a:t>‹#›</a:t>
             </a:fld>
             <a:endParaRPr lang="en-GB"/>
@@ -4771,7 +4830,8 @@
           <a:p>
             <a:fld id="{9A8162A6-AFB1-40CE-BFCE-BD39DA0AC5AC}" type="datetimeFigureOut">
               <a:rPr lang="en-US" smtClean="0"/>
-              <a:t>12/14/2010</a:t>
+              <a:pPr/>
+              <a:t>12/16/2010</a:t>
             </a:fld>
             <a:endParaRPr lang="en-GB"/>
           </a:p>
@@ -4813,6 +4873,7 @@
           <a:p>
             <a:fld id="{BE51FA57-2C5B-4F35-8B3F-13B1820A9FFF}" type="slidenum">
               <a:rPr lang="en-GB" smtClean="0"/>
+              <a:pPr/>
               <a:t>‹#›</a:t>
             </a:fld>
             <a:endParaRPr lang="en-GB"/>
@@ -5188,7 +5249,8 @@
           <a:p>
             <a:fld id="{9A8162A6-AFB1-40CE-BFCE-BD39DA0AC5AC}" type="datetimeFigureOut">
               <a:rPr lang="en-US" smtClean="0"/>
-              <a:t>12/14/2010</a:t>
+              <a:pPr/>
+              <a:t>12/16/2010</a:t>
             </a:fld>
             <a:endParaRPr lang="en-GB"/>
           </a:p>
@@ -5230,6 +5292,7 @@
           <a:p>
             <a:fld id="{BE51FA57-2C5B-4F35-8B3F-13B1820A9FFF}" type="slidenum">
               <a:rPr lang="en-GB" smtClean="0"/>
+              <a:pPr/>
               <a:t>‹#›</a:t>
             </a:fld>
             <a:endParaRPr lang="en-GB"/>
@@ -5301,7 +5364,8 @@
           <a:p>
             <a:fld id="{9A8162A6-AFB1-40CE-BFCE-BD39DA0AC5AC}" type="datetimeFigureOut">
               <a:rPr lang="en-US" smtClean="0"/>
-              <a:t>12/14/2010</a:t>
+              <a:pPr/>
+              <a:t>12/16/2010</a:t>
             </a:fld>
             <a:endParaRPr lang="en-GB"/>
           </a:p>
@@ -5343,6 +5407,7 @@
           <a:p>
             <a:fld id="{BE51FA57-2C5B-4F35-8B3F-13B1820A9FFF}" type="slidenum">
               <a:rPr lang="en-GB" smtClean="0"/>
+              <a:pPr/>
               <a:t>‹#›</a:t>
             </a:fld>
             <a:endParaRPr lang="en-GB"/>
@@ -5391,7 +5456,8 @@
           <a:p>
             <a:fld id="{9A8162A6-AFB1-40CE-BFCE-BD39DA0AC5AC}" type="datetimeFigureOut">
               <a:rPr lang="en-US" smtClean="0"/>
-              <a:t>12/14/2010</a:t>
+              <a:pPr/>
+              <a:t>12/16/2010</a:t>
             </a:fld>
             <a:endParaRPr lang="en-GB"/>
           </a:p>
@@ -5433,6 +5499,7 @@
           <a:p>
             <a:fld id="{BE51FA57-2C5B-4F35-8B3F-13B1820A9FFF}" type="slidenum">
               <a:rPr lang="en-GB" smtClean="0"/>
+              <a:pPr/>
               <a:t>‹#›</a:t>
             </a:fld>
             <a:endParaRPr lang="en-GB"/>
@@ -5663,7 +5730,8 @@
           <a:p>
             <a:fld id="{9A8162A6-AFB1-40CE-BFCE-BD39DA0AC5AC}" type="datetimeFigureOut">
               <a:rPr lang="en-US" smtClean="0"/>
-              <a:t>12/14/2010</a:t>
+              <a:pPr/>
+              <a:t>12/16/2010</a:t>
             </a:fld>
             <a:endParaRPr lang="en-GB"/>
           </a:p>
@@ -5705,6 +5773,7 @@
           <a:p>
             <a:fld id="{BE51FA57-2C5B-4F35-8B3F-13B1820A9FFF}" type="slidenum">
               <a:rPr lang="en-GB" smtClean="0"/>
+              <a:pPr/>
               <a:t>‹#›</a:t>
             </a:fld>
             <a:endParaRPr lang="en-GB"/>
@@ -5911,7 +5980,8 @@
           <a:p>
             <a:fld id="{9A8162A6-AFB1-40CE-BFCE-BD39DA0AC5AC}" type="datetimeFigureOut">
               <a:rPr lang="en-US" smtClean="0"/>
-              <a:t>12/14/2010</a:t>
+              <a:pPr/>
+              <a:t>12/16/2010</a:t>
             </a:fld>
             <a:endParaRPr lang="en-GB"/>
           </a:p>
@@ -5953,6 +6023,7 @@
           <a:p>
             <a:fld id="{BE51FA57-2C5B-4F35-8B3F-13B1820A9FFF}" type="slidenum">
               <a:rPr lang="en-GB" smtClean="0"/>
+              <a:pPr/>
               <a:t>‹#›</a:t>
             </a:fld>
             <a:endParaRPr lang="en-GB"/>
@@ -6119,7 +6190,8 @@
           <a:p>
             <a:fld id="{9A8162A6-AFB1-40CE-BFCE-BD39DA0AC5AC}" type="datetimeFigureOut">
               <a:rPr lang="en-US" smtClean="0"/>
-              <a:t>12/14/2010</a:t>
+              <a:pPr/>
+              <a:t>12/16/2010</a:t>
             </a:fld>
             <a:endParaRPr lang="en-GB"/>
           </a:p>
@@ -6197,6 +6269,7 @@
           <a:p>
             <a:fld id="{BE51FA57-2C5B-4F35-8B3F-13B1820A9FFF}" type="slidenum">
               <a:rPr lang="en-GB" smtClean="0"/>
+              <a:pPr/>
               <a:t>‹#›</a:t>
             </a:fld>
             <a:endParaRPr lang="en-GB"/>
@@ -7602,6 +7675,12 @@
               <a:rPr lang="en-GB" dirty="0" smtClean="0"/>
               <a:t>Has a good interactive editor.</a:t>
             </a:r>
+          </a:p>
+          <a:p>
+            <a:r>
+              <a:rPr lang="en-GB" dirty="0" smtClean="0"/>
+              <a:t>Can create videos.</a:t>
+            </a:r>
             <a:endParaRPr lang="en-GB" dirty="0"/>
           </a:p>
         </p:txBody>
@@ -7611,6 +7690,13 @@
   <p:clrMapOvr>
     <a:masterClrMapping/>
   </p:clrMapOvr>
+  <p:timing>
+    <p:tnLst>
+      <p:par>
+        <p:cTn id="1" dur="indefinite" restart="never" nodeType="tmRoot"/>
+      </p:par>
+    </p:tnLst>
+  </p:timing>
 </p:sld>
 </file>
 
@@ -7667,6 +7753,13 @@
   <p:clrMapOvr>
     <a:masterClrMapping/>
   </p:clrMapOvr>
+  <p:timing>
+    <p:tnLst>
+      <p:par>
+        <p:cTn id="1" dur="indefinite" restart="never" nodeType="tmRoot"/>
+      </p:par>
+    </p:tnLst>
+  </p:timing>
 </p:sld>
 </file>
 
@@ -7767,6 +7860,13 @@
   <p:clrMapOvr>
     <a:masterClrMapping/>
   </p:clrMapOvr>
+  <p:timing>
+    <p:tnLst>
+      <p:par>
+        <p:cTn id="1" dur="indefinite" restart="never" nodeType="tmRoot"/>
+      </p:par>
+    </p:tnLst>
+  </p:timing>
 </p:sld>
 </file>
 
@@ -7873,6 +7973,13 @@
   <p:clrMapOvr>
     <a:masterClrMapping/>
   </p:clrMapOvr>
+  <p:timing>
+    <p:tnLst>
+      <p:par>
+        <p:cTn id="1" dur="indefinite" restart="never" nodeType="tmRoot"/>
+      </p:par>
+    </p:tnLst>
+  </p:timing>
 </p:sld>
 </file>
 
@@ -7950,6 +8057,13 @@
   <p:clrMapOvr>
     <a:masterClrMapping/>
   </p:clrMapOvr>
+  <p:timing>
+    <p:tnLst>
+      <p:par>
+        <p:cTn id="1" dur="indefinite" restart="never" nodeType="tmRoot"/>
+      </p:par>
+    </p:tnLst>
+  </p:timing>
 </p:sld>
 </file>
 
@@ -8072,6 +8186,13 @@
   <p:clrMapOvr>
     <a:masterClrMapping/>
   </p:clrMapOvr>
+  <p:timing>
+    <p:tnLst>
+      <p:par>
+        <p:cTn id="1" dur="indefinite" restart="never" nodeType="tmRoot"/>
+      </p:par>
+    </p:tnLst>
+  </p:timing>
 </p:sld>
 </file>
 
@@ -8155,6 +8276,13 @@
   <p:clrMapOvr>
     <a:masterClrMapping/>
   </p:clrMapOvr>
+  <p:timing>
+    <p:tnLst>
+      <p:par>
+        <p:cTn id="1" dur="indefinite" restart="never" nodeType="tmRoot"/>
+      </p:par>
+    </p:tnLst>
+  </p:timing>
 </p:sld>
 </file>
 
@@ -8247,6 +8375,13 @@
   <p:clrMapOvr>
     <a:masterClrMapping/>
   </p:clrMapOvr>
+  <p:timing>
+    <p:tnLst>
+      <p:par>
+        <p:cTn id="1" dur="indefinite" restart="never" nodeType="tmRoot"/>
+      </p:par>
+    </p:tnLst>
+  </p:timing>
 </p:sld>
 </file>
 
@@ -8333,6 +8468,13 @@
   <p:clrMapOvr>
     <a:masterClrMapping/>
   </p:clrMapOvr>
+  <p:timing>
+    <p:tnLst>
+      <p:par>
+        <p:cTn id="1" dur="indefinite" restart="never" nodeType="tmRoot"/>
+      </p:par>
+    </p:tnLst>
+  </p:timing>
 </p:sld>
 </file>
 

</xml_diff>